<commit_message>
Minor fixes on inheritance basics slides
</commit_message>
<xml_diff>
--- a/Courses/Software-Sciences/Module-1-OOP/09.1-Inheritance-Basics/09.1-Inheritance-Basics.pptx
+++ b/Courses/Software-Sciences/Module-1-OOP/09.1-Inheritance-Basics/09.1-Inheritance-Basics.pptx
@@ -5,10 +5,10 @@
     <p:sldMasterId id="2147483675" r:id="rId1"/>
   </p:sldMasterIdLst>
   <p:notesMasterIdLst>
-    <p:notesMasterId r:id="rId28"/>
+    <p:notesMasterId r:id="rId27"/>
   </p:notesMasterIdLst>
   <p:handoutMasterIdLst>
-    <p:handoutMasterId r:id="rId29"/>
+    <p:handoutMasterId r:id="rId28"/>
   </p:handoutMasterIdLst>
   <p:sldIdLst>
     <p:sldId id="291" r:id="rId2"/>
@@ -33,10 +33,9 @@
     <p:sldId id="494" r:id="rId21"/>
     <p:sldId id="312" r:id="rId22"/>
     <p:sldId id="315" r:id="rId23"/>
-    <p:sldId id="498" r:id="rId24"/>
-    <p:sldId id="326" r:id="rId25"/>
-    <p:sldId id="401" r:id="rId26"/>
-    <p:sldId id="493" r:id="rId27"/>
+    <p:sldId id="326" r:id="rId24"/>
+    <p:sldId id="401" r:id="rId25"/>
+    <p:sldId id="493" r:id="rId26"/>
   </p:sldIdLst>
   <p:sldSz cx="12192000" cy="6858000"/>
   <p:notesSz cx="6858000" cy="9144000"/>
@@ -138,7 +137,7 @@
   <p:extLst>
     <p:ext uri="{521415D9-36F7-43E2-AB2F-B90AF26B5E84}">
       <p14:sectionLst xmlns:p14="http://schemas.microsoft.com/office/powerpoint/2010/main">
-        <p14:section name="Intro" id="{37FF3DA2-98E3-4B11-9622-15A7DDF55582}">
+        <p14:section name="Въведение" id="{37FF3DA2-98E3-4B11-9622-15A7DDF55582}">
           <p14:sldIdLst>
             <p14:sldId id="291"/>
             <p14:sldId id="292"/>
@@ -178,7 +177,6 @@
             <p14:sldId id="494"/>
             <p14:sldId id="312"/>
             <p14:sldId id="315"/>
-            <p14:sldId id="498"/>
           </p14:sldIdLst>
         </p14:section>
         <p14:section name="Обобщение" id="{93303A64-A802-4F3D-9932-56EA437A8A52}">
@@ -266,7 +264,7 @@
             </a:lvl1pPr>
           </a:lstStyle>
           <a:p>
-            <a:endParaRPr lang="bg-BG"/>
+            <a:endParaRPr lang="bg-BG" dirty="0"/>
           </a:p>
         </p:txBody>
       </p:sp>
@@ -305,9 +303,9 @@
           <a:p>
             <a:fld id="{4E087215-0C8F-4762-A664-737A353EC9A4}" type="datetimeFigureOut">
               <a:rPr lang="bg-BG" smtClean="0"/>
-              <a:t>21.01.23 г.</a:t>
+              <a:t>17.05.23 г.</a:t>
             </a:fld>
-            <a:endParaRPr lang="bg-BG"/>
+            <a:endParaRPr lang="bg-BG" dirty="0"/>
           </a:p>
         </p:txBody>
       </p:sp>
@@ -463,7 +461,7 @@
             </a:lvl1pPr>
           </a:lstStyle>
           <a:p>
-            <a:endParaRPr lang="en-US"/>
+            <a:endParaRPr lang="en-US" dirty="0"/>
           </a:p>
         </p:txBody>
       </p:sp>
@@ -496,9 +494,9 @@
           <a:p>
             <a:fld id="{72D84649-876A-46C9-8472-14CB09C070D8}" type="datetimeFigureOut">
               <a:rPr lang="en-US" smtClean="0"/>
-              <a:t>1/21/23</a:t>
+              <a:t>5/17/23</a:t>
             </a:fld>
-            <a:endParaRPr lang="en-US"/>
+            <a:endParaRPr lang="en-US" dirty="0"/>
           </a:p>
         </p:txBody>
       </p:sp>
@@ -531,7 +529,7 @@
           <a:bodyPr vert="horz" lIns="91440" tIns="45720" rIns="91440" bIns="45720" rtlCol="0" anchor="ctr"/>
           <a:lstStyle/>
           <a:p>
-            <a:endParaRPr lang="en-US"/>
+            <a:endParaRPr lang="en-US" dirty="0"/>
           </a:p>
         </p:txBody>
       </p:sp>
@@ -2447,7 +2445,7 @@
           <a:bodyPr/>
           <a:lstStyle/>
           <a:p>
-            <a:endParaRPr lang="en-US"/>
+            <a:endParaRPr lang="en-US" dirty="0"/>
           </a:p>
         </p:txBody>
       </p:sp>
@@ -2469,7 +2467,7 @@
             <a:fld id="{3EBA5BD7-F043-4D1B-AA17-CD412FC534DE}" type="slidenum">
               <a:rPr lang="en-US" smtClean="0"/>
               <a:pPr/>
-              <a:t>24</a:t>
+              <a:t>23</a:t>
             </a:fld>
             <a:endParaRPr lang="en-US" dirty="0"/>
           </a:p>
@@ -2582,7 +2580,7 @@
           <a:bodyPr/>
           <a:lstStyle/>
           <a:p>
-            <a:endParaRPr lang="en-US"/>
+            <a:endParaRPr lang="en-US" dirty="0"/>
           </a:p>
         </p:txBody>
       </p:sp>
@@ -2710,7 +2708,7 @@
             <a:fld id="{3EBA5BD7-F043-4D1B-AA17-CD412FC534DE}" type="slidenum">
               <a:rPr lang="en-US" smtClean="0"/>
               <a:pPr/>
-              <a:t>25</a:t>
+              <a:t>24</a:t>
             </a:fld>
             <a:endParaRPr lang="en-US" dirty="0"/>
           </a:p>
@@ -2951,7 +2949,7 @@
             <a:fld id="{3EBA5BD7-F043-4D1B-AA17-CD412FC534DE}" type="slidenum">
               <a:rPr lang="en-US" smtClean="0"/>
               <a:pPr/>
-              <a:t>26</a:t>
+              <a:t>25</a:t>
             </a:fld>
             <a:endParaRPr lang="en-US" dirty="0"/>
           </a:p>
@@ -4732,7 +4730,7 @@
               <a:tabLst/>
               <a:defRPr/>
             </a:pPr>
-            <a:endParaRPr kumimoji="0" lang="en-US" altLang="ko-KR" sz="2398" b="0" i="0" u="none" strike="noStrike" kern="1200" cap="none" spc="0" normalizeH="0" baseline="0" noProof="0">
+            <a:endParaRPr kumimoji="0" lang="en-US" altLang="ko-KR" sz="2398" b="0" i="0" u="none" strike="noStrike" kern="1200" cap="none" spc="0" normalizeH="0" baseline="0" noProof="0" dirty="0">
               <a:ln>
                 <a:noFill/>
               </a:ln>
@@ -5361,7 +5359,7 @@
               <a:tabLst/>
               <a:defRPr/>
             </a:pPr>
-            <a:endParaRPr kumimoji="0" lang="en-US" altLang="ko-KR" sz="2398" b="0" i="0" u="none" strike="noStrike" kern="1200" cap="none" spc="0" normalizeH="0" baseline="0" noProof="0">
+            <a:endParaRPr kumimoji="0" lang="en-US" altLang="ko-KR" sz="2398" b="0" i="0" u="none" strike="noStrike" kern="1200" cap="none" spc="0" normalizeH="0" baseline="0" noProof="0" dirty="0">
               <a:ln>
                 <a:noFill/>
               </a:ln>
@@ -5484,7 +5482,7 @@
               <a:tabLst/>
               <a:defRPr/>
             </a:pPr>
-            <a:endParaRPr kumimoji="0" lang="en-US" altLang="ko-KR" sz="2398" b="0" i="0" u="none" strike="noStrike" kern="1200" cap="none" spc="0" normalizeH="0" baseline="0" noProof="0">
+            <a:endParaRPr kumimoji="0" lang="en-US" altLang="ko-KR" sz="2398" b="0" i="0" u="none" strike="noStrike" kern="1200" cap="none" spc="0" normalizeH="0" baseline="0" noProof="0" dirty="0">
               <a:ln>
                 <a:noFill/>
               </a:ln>
@@ -5757,7 +5755,7 @@
               <a:tabLst/>
               <a:defRPr/>
             </a:pPr>
-            <a:endParaRPr kumimoji="0" lang="en-US" altLang="ko-KR" sz="2398" b="0" i="0" u="none" strike="noStrike" kern="1200" cap="none" spc="0" normalizeH="0" baseline="0" noProof="0">
+            <a:endParaRPr kumimoji="0" lang="en-US" altLang="ko-KR" sz="2398" b="0" i="0" u="none" strike="noStrike" kern="1200" cap="none" spc="0" normalizeH="0" baseline="0" noProof="0" dirty="0">
               <a:ln>
                 <a:noFill/>
               </a:ln>
@@ -5943,7 +5941,7 @@
               <a:pPr/>
               <a:t>‹#›</a:t>
             </a:fld>
-            <a:endParaRPr lang="en-US" noProof="0"/>
+            <a:endParaRPr lang="en-US" noProof="0" dirty="0"/>
           </a:p>
         </p:txBody>
       </p:sp>
@@ -6097,7 +6095,7 @@
           </a:lstStyle>
           <a:p>
             <a:r>
-              <a:rPr lang="en-US" altLang="ko-KR" noProof="0"/>
+              <a:rPr lang="en-US" altLang="ko-KR" noProof="0" dirty="0"/>
               <a:t>Your Picture Here</a:t>
             </a:r>
           </a:p>
@@ -6161,7 +6159,7 @@
               <a:tabLst/>
               <a:defRPr/>
             </a:pPr>
-            <a:endParaRPr kumimoji="0" lang="en-US" altLang="ko-KR" sz="2398" b="0" i="0" u="none" strike="noStrike" kern="1200" cap="none" spc="0" normalizeH="0" baseline="0" noProof="0">
+            <a:endParaRPr kumimoji="0" lang="en-US" altLang="ko-KR" sz="2398" b="0" i="0" u="none" strike="noStrike" kern="1200" cap="none" spc="0" normalizeH="0" baseline="0" noProof="0" dirty="0">
               <a:ln>
                 <a:noFill/>
               </a:ln>
@@ -6236,7 +6234,7 @@
               <a:tabLst/>
               <a:defRPr/>
             </a:pPr>
-            <a:endParaRPr kumimoji="0" lang="en-US" altLang="ko-KR" sz="2398" b="0" i="0" u="none" strike="noStrike" kern="1200" cap="none" spc="0" normalizeH="0" baseline="0" noProof="0">
+            <a:endParaRPr kumimoji="0" lang="en-US" altLang="ko-KR" sz="2398" b="0" i="0" u="none" strike="noStrike" kern="1200" cap="none" spc="0" normalizeH="0" baseline="0" noProof="0" dirty="0">
               <a:ln>
                 <a:noFill/>
               </a:ln>
@@ -6317,7 +6315,7 @@
               <a:tabLst/>
               <a:defRPr/>
             </a:pPr>
-            <a:endParaRPr kumimoji="0" lang="en-US" altLang="ko-KR" sz="2398" b="0" i="0" u="none" strike="noStrike" kern="1200" cap="none" spc="0" normalizeH="0" baseline="0" noProof="0">
+            <a:endParaRPr kumimoji="0" lang="en-US" altLang="ko-KR" sz="2398" b="0" i="0" u="none" strike="noStrike" kern="1200" cap="none" spc="0" normalizeH="0" baseline="0" noProof="0" dirty="0">
               <a:ln>
                 <a:noFill/>
               </a:ln>
@@ -6398,7 +6396,7 @@
               <a:tabLst/>
               <a:defRPr/>
             </a:pPr>
-            <a:endParaRPr kumimoji="0" lang="en-US" altLang="ko-KR" sz="2398" b="0" i="0" u="none" strike="noStrike" kern="1200" cap="none" spc="0" normalizeH="0" baseline="0" noProof="0">
+            <a:endParaRPr kumimoji="0" lang="en-US" altLang="ko-KR" sz="2398" b="0" i="0" u="none" strike="noStrike" kern="1200" cap="none" spc="0" normalizeH="0" baseline="0" noProof="0" dirty="0">
               <a:ln>
                 <a:noFill/>
               </a:ln>
@@ -6602,7 +6600,7 @@
               <a:tabLst/>
               <a:defRPr/>
             </a:pPr>
-            <a:endParaRPr kumimoji="0" lang="en-US" altLang="ko-KR" sz="2398" b="0" i="0" u="none" strike="noStrike" kern="1200" cap="none" spc="0" normalizeH="0" baseline="0" noProof="0">
+            <a:endParaRPr kumimoji="0" lang="en-US" altLang="ko-KR" sz="2398" b="0" i="0" u="none" strike="noStrike" kern="1200" cap="none" spc="0" normalizeH="0" baseline="0" noProof="0" dirty="0">
               <a:ln>
                 <a:noFill/>
               </a:ln>
@@ -8108,7 +8106,7 @@
               <a:tabLst/>
               <a:defRPr/>
             </a:pPr>
-            <a:endParaRPr kumimoji="0" lang="en-US" altLang="ko-KR" sz="2398" b="0" i="0" u="none" strike="noStrike" kern="1200" cap="none" spc="0" normalizeH="0" baseline="0" noProof="0">
+            <a:endParaRPr kumimoji="0" lang="en-US" altLang="ko-KR" sz="2398" b="0" i="0" u="none" strike="noStrike" kern="1200" cap="none" spc="0" normalizeH="0" baseline="0" noProof="0" dirty="0">
               <a:ln>
                 <a:noFill/>
               </a:ln>
@@ -8436,7 +8434,7 @@
               <a:tabLst/>
               <a:defRPr/>
             </a:pPr>
-            <a:endParaRPr kumimoji="0" lang="en-US" altLang="ko-KR" sz="2398" b="0" i="0" u="none" strike="noStrike" kern="1200" cap="none" spc="0" normalizeH="0" baseline="0" noProof="0">
+            <a:endParaRPr kumimoji="0" lang="en-US" altLang="ko-KR" sz="2398" b="0" i="0" u="none" strike="noStrike" kern="1200" cap="none" spc="0" normalizeH="0" baseline="0" noProof="0" dirty="0">
               <a:ln>
                 <a:noFill/>
               </a:ln>
@@ -8606,7 +8604,7 @@
               <a:pPr/>
               <a:t>‹#›</a:t>
             </a:fld>
-            <a:endParaRPr lang="en-US" noProof="0"/>
+            <a:endParaRPr lang="en-US" noProof="0" dirty="0"/>
           </a:p>
         </p:txBody>
       </p:sp>
@@ -8801,7 +8799,7 @@
               <a:tabLst/>
               <a:defRPr/>
             </a:pPr>
-            <a:endParaRPr kumimoji="0" lang="en-US" altLang="ko-KR" sz="2398" b="0" i="0" u="none" strike="noStrike" kern="1200" cap="none" spc="0" normalizeH="0" baseline="0" noProof="0">
+            <a:endParaRPr kumimoji="0" lang="en-US" altLang="ko-KR" sz="2398" b="0" i="0" u="none" strike="noStrike" kern="1200" cap="none" spc="0" normalizeH="0" baseline="0" noProof="0" dirty="0">
               <a:ln>
                 <a:noFill/>
               </a:ln>
@@ -10062,7 +10060,7 @@
               <a:pPr/>
               <a:t>‹#›</a:t>
             </a:fld>
-            <a:endParaRPr lang="en-US" noProof="0"/>
+            <a:endParaRPr lang="en-US" noProof="0" dirty="0"/>
           </a:p>
         </p:txBody>
       </p:sp>
@@ -10130,7 +10128,7 @@
               <a:tabLst/>
               <a:defRPr/>
             </a:pPr>
-            <a:endParaRPr kumimoji="0" lang="en-US" altLang="ko-KR" sz="2398" b="0" i="0" u="none" strike="noStrike" kern="1200" cap="none" spc="0" normalizeH="0" baseline="0" noProof="0">
+            <a:endParaRPr kumimoji="0" lang="en-US" altLang="ko-KR" sz="2398" b="0" i="0" u="none" strike="noStrike" kern="1200" cap="none" spc="0" normalizeH="0" baseline="0" noProof="0" dirty="0">
               <a:ln>
                 <a:noFill/>
               </a:ln>
@@ -10498,7 +10496,7 @@
               <a:tabLst/>
               <a:defRPr/>
             </a:pPr>
-            <a:endParaRPr kumimoji="0" lang="en-US" altLang="ko-KR" sz="2398" b="0" i="0" u="none" strike="noStrike" kern="1200" cap="none" spc="0" normalizeH="0" baseline="0" noProof="0">
+            <a:endParaRPr kumimoji="0" lang="en-US" altLang="ko-KR" sz="2398" b="0" i="0" u="none" strike="noStrike" kern="1200" cap="none" spc="0" normalizeH="0" baseline="0" noProof="0" dirty="0">
               <a:ln>
                 <a:noFill/>
               </a:ln>
@@ -12317,7 +12315,7 @@
               <a:t>Могат да се </a:t>
             </a:r>
             <a:r>
-              <a:rPr lang="bg-BG" b="1" dirty="0" err="1">
+              <a:rPr lang="bg-BG" b="1" dirty="0">
                 <a:solidFill>
                   <a:schemeClr val="bg1"/>
                 </a:solidFill>
@@ -17050,7 +17048,7 @@
               <a:rPr lang="en-US" dirty="0">
                 <a:hlinkClick r:id="rId3"/>
               </a:rPr>
-              <a:t>https://judge.softuni.bg/Contests/Practice/Index/3164#0</a:t>
+              <a:t>https://judge.softuni.org/Contests/Practice/Index/4064#0</a:t>
             </a:r>
             <a:endParaRPr lang="en-US" dirty="0"/>
           </a:p>
@@ -17860,7 +17858,7 @@
               <a:rPr lang="en-US" dirty="0">
                 <a:hlinkClick r:id="rId2"/>
               </a:rPr>
-              <a:t>https://judge.softuni.bg/Contests/Practice/Index/3164#1</a:t>
+              <a:t>https://judge.softuni.org/Contests/Practice/Index/4064#1</a:t>
             </a:r>
             <a:endParaRPr lang="en-US" dirty="0"/>
           </a:p>
@@ -19754,7 +19752,7 @@
               <a:rPr lang="en-US" dirty="0">
                 <a:hlinkClick r:id="rId2"/>
               </a:rPr>
-              <a:t>https://judge.softuni.bg/Contests/Practice/Index/3164#2</a:t>
+              <a:t>https://judge.softuni.org/Contests/Practice/Index/4064#2</a:t>
             </a:r>
             <a:endParaRPr lang="en-US" dirty="0"/>
           </a:p>
@@ -21847,127 +21845,6 @@
       </p:grpSpPr>
       <p:sp>
         <p:nvSpPr>
-          <p:cNvPr id="2" name="Slide Number Placeholder 1">
-            <a:extLst>
-              <a:ext uri="{FF2B5EF4-FFF2-40B4-BE49-F238E27FC236}">
-                <a16:creationId xmlns:a16="http://schemas.microsoft.com/office/drawing/2014/main" id="{0E789651-033F-7240-AB33-AE4CEE1FF1B9}"/>
-              </a:ext>
-            </a:extLst>
-          </p:cNvPr>
-          <p:cNvSpPr>
-            <a:spLocks noGrp="1"/>
-          </p:cNvSpPr>
-          <p:nvPr>
-            <p:ph type="sldNum" sz="quarter" idx="5"/>
-          </p:nvPr>
-        </p:nvSpPr>
-        <p:spPr/>
-        <p:txBody>
-          <a:bodyPr/>
-          <a:lstStyle/>
-          <a:p>
-            <a:fld id="{2BF067CD-8E6B-4360-9AA8-C5DF2A48A6D1}" type="slidenum">
-              <a:rPr lang="en-US" noProof="0" smtClean="0"/>
-              <a:pPr/>
-              <a:t>23</a:t>
-            </a:fld>
-            <a:endParaRPr lang="en-US" noProof="0" dirty="0"/>
-          </a:p>
-        </p:txBody>
-      </p:sp>
-      <p:sp>
-        <p:nvSpPr>
-          <p:cNvPr id="3" name="Text Placeholder 2">
-            <a:extLst>
-              <a:ext uri="{FF2B5EF4-FFF2-40B4-BE49-F238E27FC236}">
-                <a16:creationId xmlns:a16="http://schemas.microsoft.com/office/drawing/2014/main" id="{10B732BC-8D18-D55C-FC1D-7C418F70C7EE}"/>
-              </a:ext>
-            </a:extLst>
-          </p:cNvPr>
-          <p:cNvSpPr>
-            <a:spLocks noGrp="1"/>
-          </p:cNvSpPr>
-          <p:nvPr>
-            <p:ph type="body" sz="quarter" idx="10"/>
-          </p:nvPr>
-        </p:nvSpPr>
-        <p:spPr/>
-        <p:txBody>
-          <a:bodyPr/>
-          <a:lstStyle/>
-          <a:p>
-            <a:r>
-              <a:rPr lang="en-BG" dirty="0"/>
-              <a:t>TODO: Add a problem with private/protected members &amp; virtual methods</a:t>
-            </a:r>
-          </a:p>
-        </p:txBody>
-      </p:sp>
-      <p:sp>
-        <p:nvSpPr>
-          <p:cNvPr id="4" name="Title 3">
-            <a:extLst>
-              <a:ext uri="{FF2B5EF4-FFF2-40B4-BE49-F238E27FC236}">
-                <a16:creationId xmlns:a16="http://schemas.microsoft.com/office/drawing/2014/main" id="{3CDD16A2-781D-494A-0349-E1046F437410}"/>
-              </a:ext>
-            </a:extLst>
-          </p:cNvPr>
-          <p:cNvSpPr>
-            <a:spLocks noGrp="1"/>
-          </p:cNvSpPr>
-          <p:nvPr>
-            <p:ph type="title"/>
-          </p:nvPr>
-        </p:nvSpPr>
-        <p:spPr/>
-        <p:txBody>
-          <a:bodyPr/>
-          <a:lstStyle/>
-          <a:p>
-            <a:endParaRPr lang="en-BG" dirty="0"/>
-          </a:p>
-        </p:txBody>
-      </p:sp>
-    </p:spTree>
-    <p:extLst>
-      <p:ext uri="{BB962C8B-B14F-4D97-AF65-F5344CB8AC3E}">
-        <p14:creationId xmlns:p14="http://schemas.microsoft.com/office/powerpoint/2010/main" val="2419709676"/>
-      </p:ext>
-    </p:extLst>
-  </p:cSld>
-  <p:clrMapOvr>
-    <a:masterClrMapping/>
-  </p:clrMapOvr>
-  <mc:AlternateContent xmlns:mc="http://schemas.openxmlformats.org/markup-compatibility/2006" xmlns:p14="http://schemas.microsoft.com/office/powerpoint/2010/main">
-    <mc:Choice Requires="p14">
-      <p:transition spd="slow" p14:dur="2000" advClick="0" advTm="5000"/>
-    </mc:Choice>
-    <mc:Fallback xmlns="">
-      <p:transition spd="slow" advClick="0" advTm="5000"/>
-    </mc:Fallback>
-  </mc:AlternateContent>
-</p:sld>
-</file>
-
-<file path=ppt/slides/slide24.xml><?xml version="1.0" encoding="utf-8"?>
-<p:sld xmlns:a="http://schemas.openxmlformats.org/drawingml/2006/main" xmlns:r="http://schemas.openxmlformats.org/officeDocument/2006/relationships" xmlns:p="http://schemas.openxmlformats.org/presentationml/2006/main">
-  <p:cSld>
-    <p:spTree>
-      <p:nvGrpSpPr>
-        <p:cNvPr id="1" name=""/>
-        <p:cNvGrpSpPr/>
-        <p:nvPr/>
-      </p:nvGrpSpPr>
-      <p:grpSpPr>
-        <a:xfrm>
-          <a:off x="0" y="0"/>
-          <a:ext cx="0" cy="0"/>
-          <a:chOff x="0" y="0"/>
-          <a:chExt cx="0" cy="0"/>
-        </a:xfrm>
-      </p:grpSpPr>
-      <p:sp>
-        <p:nvSpPr>
           <p:cNvPr id="14" name="Text Placeholder 4">
             <a:extLst>
               <a:ext uri="{FF2B5EF4-FFF2-40B4-BE49-F238E27FC236}">
@@ -22217,7 +22094,7 @@
             <a:lstStyle/>
             <a:p>
               <a:pPr algn="ctr"/>
-              <a:endParaRPr lang="ko-KR" altLang="en-US" sz="2399">
+              <a:endParaRPr lang="ko-KR" altLang="en-US" sz="2399" dirty="0">
                 <a:solidFill>
                   <a:schemeClr val="bg1"/>
                 </a:solidFill>
@@ -22278,7 +22155,7 @@
             <a:lstStyle/>
             <a:p>
               <a:pPr algn="ctr"/>
-              <a:endParaRPr lang="ko-KR" altLang="en-US" sz="2399">
+              <a:endParaRPr lang="ko-KR" altLang="en-US" sz="2399" dirty="0">
                 <a:solidFill>
                   <a:schemeClr val="tx1"/>
                 </a:solidFill>
@@ -22538,17 +22415,6 @@
               </a:rPr>
             </a:br>
             <a:r>
-              <a:rPr lang="bg-BG" sz="3600" b="1" dirty="0" err="1">
-                <a:solidFill>
-                  <a:schemeClr val="bg1">
-                    <a:lumMod val="60000"/>
-                    <a:lumOff val="40000"/>
-                  </a:schemeClr>
-                </a:solidFill>
-              </a:rPr>
-              <a:t>преизползваме</a:t>
-            </a:r>
-            <a:r>
               <a:rPr lang="bg-BG" sz="3600" b="1" dirty="0">
                 <a:solidFill>
                   <a:schemeClr val="bg1">
@@ -22557,7 +22423,7 @@
                   </a:schemeClr>
                 </a:solidFill>
               </a:rPr>
-              <a:t> код</a:t>
+              <a:t>преизползваме код</a:t>
             </a:r>
             <a:endParaRPr lang="en-US" sz="3600" b="1" dirty="0">
               <a:solidFill>
@@ -22764,7 +22630,7 @@
             <a:fld id="{2BF067CD-8E6B-4360-9AA8-C5DF2A48A6D1}" type="slidenum">
               <a:rPr lang="en-US" noProof="0" smtClean="0"/>
               <a:pPr/>
-              <a:t>24</a:t>
+              <a:t>23</a:t>
             </a:fld>
             <a:endParaRPr lang="en-US" noProof="0" dirty="0"/>
           </a:p>
@@ -22919,7 +22785,7 @@
 </p:sld>
 </file>
 
-<file path=ppt/slides/slide25.xml><?xml version="1.0" encoding="utf-8"?>
+<file path=ppt/slides/slide24.xml><?xml version="1.0" encoding="utf-8"?>
 <p:sld xmlns:a="http://schemas.openxmlformats.org/drawingml/2006/main" xmlns:r="http://schemas.openxmlformats.org/officeDocument/2006/relationships" xmlns:p="http://schemas.openxmlformats.org/presentationml/2006/main">
   <p:cSld>
     <p:spTree>
@@ -22998,7 +22864,7 @@
 </p:sld>
 </file>
 
-<file path=ppt/slides/slide26.xml><?xml version="1.0" encoding="utf-8"?>
+<file path=ppt/slides/slide25.xml><?xml version="1.0" encoding="utf-8"?>
 <p:sld xmlns:a="http://schemas.openxmlformats.org/drawingml/2006/main" xmlns:r="http://schemas.openxmlformats.org/officeDocument/2006/relationships" xmlns:p="http://schemas.openxmlformats.org/presentationml/2006/main">
   <p:cSld>
     <p:spTree>
@@ -23106,7 +22972,7 @@
               <a:t>© </a:t>
             </a:r>
             <a:r>
-              <a:rPr lang="bg-BG" dirty="0" err="1"/>
+              <a:rPr lang="bg-BG" dirty="0"/>
               <a:t>СофтУни</a:t>
             </a:r>
             <a:r>
@@ -23271,7 +23137,7 @@
             <a:fld id="{2BF067CD-8E6B-4360-9AA8-C5DF2A48A6D1}" type="slidenum">
               <a:rPr lang="en-US" noProof="0" smtClean="0"/>
               <a:pPr/>
-              <a:t>26</a:t>
+              <a:t>25</a:t>
             </a:fld>
             <a:endParaRPr lang="en-US" noProof="0" dirty="0"/>
           </a:p>

</xml_diff>